<commit_message>
update powerpoint and images
</commit_message>
<xml_diff>
--- a/ThingSpaceTsM2.pptx
+++ b/ThingSpaceTsM2.pptx
@@ -313,7 +313,7 @@
           <a:p>
             <a:fld id="{D17C0673-4D49-4E82-8C72-D8AA60F272CB}" type="datetimeFigureOut">
               <a:rPr lang="pl-PL" smtClean="0"/>
-              <a:t>26.11.2025</a:t>
+              <a:t>28.11.2025</a:t>
             </a:fld>
             <a:endParaRPr lang="pl-PL"/>
           </a:p>
@@ -594,7 +594,7 @@
           <a:p>
             <a:fld id="{D17C0673-4D49-4E82-8C72-D8AA60F272CB}" type="datetimeFigureOut">
               <a:rPr lang="pl-PL" smtClean="0"/>
-              <a:t>26.11.2025</a:t>
+              <a:t>28.11.2025</a:t>
             </a:fld>
             <a:endParaRPr lang="pl-PL"/>
           </a:p>
@@ -786,7 +786,7 @@
           <a:p>
             <a:fld id="{D17C0673-4D49-4E82-8C72-D8AA60F272CB}" type="datetimeFigureOut">
               <a:rPr lang="pl-PL" smtClean="0"/>
-              <a:t>26.11.2025</a:t>
+              <a:t>28.11.2025</a:t>
             </a:fld>
             <a:endParaRPr lang="pl-PL"/>
           </a:p>
@@ -1047,7 +1047,7 @@
           <a:p>
             <a:fld id="{D17C0673-4D49-4E82-8C72-D8AA60F272CB}" type="datetimeFigureOut">
               <a:rPr lang="pl-PL" smtClean="0"/>
-              <a:t>26.11.2025</a:t>
+              <a:t>28.11.2025</a:t>
             </a:fld>
             <a:endParaRPr lang="pl-PL"/>
           </a:p>
@@ -1473,7 +1473,7 @@
           <a:p>
             <a:fld id="{D17C0673-4D49-4E82-8C72-D8AA60F272CB}" type="datetimeFigureOut">
               <a:rPr lang="pl-PL" smtClean="0"/>
-              <a:t>26.11.2025</a:t>
+              <a:t>28.11.2025</a:t>
             </a:fld>
             <a:endParaRPr lang="pl-PL"/>
           </a:p>
@@ -2019,7 +2019,7 @@
           <a:p>
             <a:fld id="{D17C0673-4D49-4E82-8C72-D8AA60F272CB}" type="datetimeFigureOut">
               <a:rPr lang="pl-PL" smtClean="0"/>
-              <a:t>26.11.2025</a:t>
+              <a:t>28.11.2025</a:t>
             </a:fld>
             <a:endParaRPr lang="pl-PL"/>
           </a:p>
@@ -2850,7 +2850,7 @@
           <a:p>
             <a:fld id="{D17C0673-4D49-4E82-8C72-D8AA60F272CB}" type="datetimeFigureOut">
               <a:rPr lang="pl-PL" smtClean="0"/>
-              <a:t>26.11.2025</a:t>
+              <a:t>28.11.2025</a:t>
             </a:fld>
             <a:endParaRPr lang="pl-PL"/>
           </a:p>
@@ -3020,7 +3020,7 @@
           <a:p>
             <a:fld id="{D17C0673-4D49-4E82-8C72-D8AA60F272CB}" type="datetimeFigureOut">
               <a:rPr lang="pl-PL" smtClean="0"/>
-              <a:t>26.11.2025</a:t>
+              <a:t>28.11.2025</a:t>
             </a:fld>
             <a:endParaRPr lang="pl-PL"/>
           </a:p>
@@ -3200,7 +3200,7 @@
           <a:p>
             <a:fld id="{D17C0673-4D49-4E82-8C72-D8AA60F272CB}" type="datetimeFigureOut">
               <a:rPr lang="pl-PL" smtClean="0"/>
-              <a:t>26.11.2025</a:t>
+              <a:t>28.11.2025</a:t>
             </a:fld>
             <a:endParaRPr lang="pl-PL"/>
           </a:p>
@@ -3370,7 +3370,7 @@
           <a:p>
             <a:fld id="{D17C0673-4D49-4E82-8C72-D8AA60F272CB}" type="datetimeFigureOut">
               <a:rPr lang="pl-PL" smtClean="0"/>
-              <a:t>26.11.2025</a:t>
+              <a:t>28.11.2025</a:t>
             </a:fld>
             <a:endParaRPr lang="pl-PL"/>
           </a:p>
@@ -3627,7 +3627,7 @@
           <a:p>
             <a:fld id="{D17C0673-4D49-4E82-8C72-D8AA60F272CB}" type="datetimeFigureOut">
               <a:rPr lang="pl-PL" smtClean="0"/>
-              <a:t>26.11.2025</a:t>
+              <a:t>28.11.2025</a:t>
             </a:fld>
             <a:endParaRPr lang="pl-PL"/>
           </a:p>
@@ -3859,7 +3859,7 @@
           <a:p>
             <a:fld id="{D17C0673-4D49-4E82-8C72-D8AA60F272CB}" type="datetimeFigureOut">
               <a:rPr lang="pl-PL" smtClean="0"/>
-              <a:t>26.11.2025</a:t>
+              <a:t>28.11.2025</a:t>
             </a:fld>
             <a:endParaRPr lang="pl-PL"/>
           </a:p>
@@ -4252,7 +4252,7 @@
           <a:p>
             <a:fld id="{D17C0673-4D49-4E82-8C72-D8AA60F272CB}" type="datetimeFigureOut">
               <a:rPr lang="pl-PL" smtClean="0"/>
-              <a:t>26.11.2025</a:t>
+              <a:t>28.11.2025</a:t>
             </a:fld>
             <a:endParaRPr lang="pl-PL"/>
           </a:p>
@@ -4370,7 +4370,7 @@
           <a:p>
             <a:fld id="{D17C0673-4D49-4E82-8C72-D8AA60F272CB}" type="datetimeFigureOut">
               <a:rPr lang="pl-PL" smtClean="0"/>
-              <a:t>26.11.2025</a:t>
+              <a:t>28.11.2025</a:t>
             </a:fld>
             <a:endParaRPr lang="pl-PL"/>
           </a:p>
@@ -4465,7 +4465,7 @@
           <a:p>
             <a:fld id="{D17C0673-4D49-4E82-8C72-D8AA60F272CB}" type="datetimeFigureOut">
               <a:rPr lang="pl-PL" smtClean="0"/>
-              <a:t>26.11.2025</a:t>
+              <a:t>28.11.2025</a:t>
             </a:fld>
             <a:endParaRPr lang="pl-PL"/>
           </a:p>
@@ -4738,7 +4738,7 @@
           <a:p>
             <a:fld id="{D17C0673-4D49-4E82-8C72-D8AA60F272CB}" type="datetimeFigureOut">
               <a:rPr lang="pl-PL" smtClean="0"/>
-              <a:t>26.11.2025</a:t>
+              <a:t>28.11.2025</a:t>
             </a:fld>
             <a:endParaRPr lang="pl-PL"/>
           </a:p>
@@ -5019,7 +5019,7 @@
           <a:p>
             <a:fld id="{D17C0673-4D49-4E82-8C72-D8AA60F272CB}" type="datetimeFigureOut">
               <a:rPr lang="pl-PL" smtClean="0"/>
-              <a:t>26.11.2025</a:t>
+              <a:t>28.11.2025</a:t>
             </a:fld>
             <a:endParaRPr lang="pl-PL"/>
           </a:p>
@@ -5259,7 +5259,7 @@
           <a:p>
             <a:fld id="{D17C0673-4D49-4E82-8C72-D8AA60F272CB}" type="datetimeFigureOut">
               <a:rPr lang="pl-PL" smtClean="0"/>
-              <a:t>26.11.2025</a:t>
+              <a:t>28.11.2025</a:t>
             </a:fld>
             <a:endParaRPr lang="pl-PL"/>
           </a:p>
@@ -11179,6 +11179,7 @@
             </a:extLst>
           </p:cNvPr>
           <p:cNvCxnSpPr>
+            <a:cxnSpLocks/>
             <a:stCxn id="4" idx="3"/>
             <a:endCxn id="25" idx="1"/>
           </p:cNvCxnSpPr>
@@ -11432,6 +11433,7 @@
             </a:extLst>
           </p:cNvPr>
           <p:cNvCxnSpPr>
+            <a:cxnSpLocks/>
             <a:stCxn id="25" idx="3"/>
             <a:endCxn id="22" idx="1"/>
           </p:cNvCxnSpPr>
@@ -11749,47 +11751,6 @@
           </a:fontRef>
         </p:style>
       </p:cxnSp>
-      <p:cxnSp>
-        <p:nvCxnSpPr>
-          <p:cNvPr id="39" name="Straight Arrow Connector 38">
-            <a:extLst>
-              <a:ext uri="{FF2B5EF4-FFF2-40B4-BE49-F238E27FC236}">
-                <a16:creationId xmlns:a16="http://schemas.microsoft.com/office/drawing/2014/main" id="{2B2E2071-9B9D-A638-CDD1-C00C6F9B63BA}"/>
-              </a:ext>
-            </a:extLst>
-          </p:cNvPr>
-          <p:cNvCxnSpPr>
-            <a:endCxn id="25" idx="1"/>
-          </p:cNvCxnSpPr>
-          <p:nvPr/>
-        </p:nvCxnSpPr>
-        <p:spPr>
-          <a:xfrm>
-            <a:off x="2980372" y="4038996"/>
-            <a:ext cx="460916" cy="0"/>
-          </a:xfrm>
-          <a:prstGeom prst="straightConnector1">
-            <a:avLst/>
-          </a:prstGeom>
-          <a:ln>
-            <a:tailEnd type="triangle"/>
-          </a:ln>
-        </p:spPr>
-        <p:style>
-          <a:lnRef idx="1">
-            <a:schemeClr val="accent3"/>
-          </a:lnRef>
-          <a:fillRef idx="0">
-            <a:schemeClr val="accent3"/>
-          </a:fillRef>
-          <a:effectRef idx="0">
-            <a:schemeClr val="accent3"/>
-          </a:effectRef>
-          <a:fontRef idx="minor">
-            <a:schemeClr val="tx1"/>
-          </a:fontRef>
-        </p:style>
-      </p:cxnSp>
       <p:sp>
         <p:nvSpPr>
           <p:cNvPr id="44" name="Freeform: Shape 43">
@@ -11944,6 +11905,45 @@
           <a:xfrm flipH="1">
             <a:off x="1373458" y="3884352"/>
             <a:ext cx="7975" cy="534213"/>
+          </a:xfrm>
+          <a:prstGeom prst="straightConnector1">
+            <a:avLst/>
+          </a:prstGeom>
+          <a:ln>
+            <a:tailEnd type="triangle"/>
+          </a:ln>
+        </p:spPr>
+        <p:style>
+          <a:lnRef idx="1">
+            <a:schemeClr val="accent6"/>
+          </a:lnRef>
+          <a:fillRef idx="0">
+            <a:schemeClr val="accent6"/>
+          </a:fillRef>
+          <a:effectRef idx="0">
+            <a:schemeClr val="accent6"/>
+          </a:effectRef>
+          <a:fontRef idx="minor">
+            <a:schemeClr val="tx1"/>
+          </a:fontRef>
+        </p:style>
+      </p:cxnSp>
+      <p:cxnSp>
+        <p:nvCxnSpPr>
+          <p:cNvPr id="7" name="Straight Arrow Connector 6">
+            <a:extLst>
+              <a:ext uri="{FF2B5EF4-FFF2-40B4-BE49-F238E27FC236}">
+                <a16:creationId xmlns:a16="http://schemas.microsoft.com/office/drawing/2014/main" id="{32698507-F0C8-E9A7-5C14-1D0DAE0103DB}"/>
+              </a:ext>
+            </a:extLst>
+          </p:cNvPr>
+          <p:cNvCxnSpPr/>
+          <p:nvPr/>
+        </p:nvCxnSpPr>
+        <p:spPr>
+          <a:xfrm flipH="1">
+            <a:off x="4231970" y="4407706"/>
+            <a:ext cx="1" cy="267106"/>
           </a:xfrm>
           <a:prstGeom prst="straightConnector1">
             <a:avLst/>

</xml_diff>